<commit_message>
documento de word y diapositivas
</commit_message>
<xml_diff>
--- a/Justificación/IdHand deapositivas.pptx
+++ b/Justificación/IdHand deapositivas.pptx
@@ -19,12 +19,13 @@
     <p:sldId id="274" r:id="rId13"/>
     <p:sldId id="275" r:id="rId14"/>
     <p:sldId id="276" r:id="rId15"/>
-    <p:sldId id="277" r:id="rId16"/>
-    <p:sldId id="278" r:id="rId17"/>
-    <p:sldId id="279" r:id="rId18"/>
-    <p:sldId id="283" r:id="rId19"/>
-    <p:sldId id="281" r:id="rId20"/>
-    <p:sldId id="280" r:id="rId21"/>
+    <p:sldId id="285" r:id="rId16"/>
+    <p:sldId id="277" r:id="rId17"/>
+    <p:sldId id="278" r:id="rId18"/>
+    <p:sldId id="279" r:id="rId19"/>
+    <p:sldId id="283" r:id="rId20"/>
+    <p:sldId id="281" r:id="rId21"/>
+    <p:sldId id="280" r:id="rId22"/>
   </p:sldIdLst>
   <p:sldSz cx="9144000" cy="5143500" type="screen16x9"/>
   <p:notesSz cx="6858000" cy="9144000"/>
@@ -311,7 +312,7 @@
           <a:p>
             <a:fld id="{B3030C24-9424-B24A-8613-79990C3AA492}" type="datetimeFigureOut">
               <a:rPr lang="es-ES" smtClean="0"/>
-              <a:t>04/06/2020</a:t>
+              <a:t>11/06/2020</a:t>
             </a:fld>
             <a:endParaRPr lang="es-ES"/>
           </a:p>
@@ -491,7 +492,7 @@
           <a:p>
             <a:fld id="{B3030C24-9424-B24A-8613-79990C3AA492}" type="datetimeFigureOut">
               <a:rPr lang="es-ES" smtClean="0"/>
-              <a:t>04/06/2020</a:t>
+              <a:t>11/06/2020</a:t>
             </a:fld>
             <a:endParaRPr lang="es-ES"/>
           </a:p>
@@ -1128,7 +1129,7 @@
           <a:p>
             <a:fld id="{B3030C24-9424-B24A-8613-79990C3AA492}" type="datetimeFigureOut">
               <a:rPr lang="es-ES" smtClean="0"/>
-              <a:t>04/06/2020</a:t>
+              <a:t>11/06/2020</a:t>
             </a:fld>
             <a:endParaRPr lang="es-ES"/>
           </a:p>
@@ -1381,7 +1382,7 @@
           <a:p>
             <a:fld id="{B3030C24-9424-B24A-8613-79990C3AA492}" type="datetimeFigureOut">
               <a:rPr lang="es-ES" smtClean="0"/>
-              <a:t>04/06/2020</a:t>
+              <a:t>11/06/2020</a:t>
             </a:fld>
             <a:endParaRPr lang="es-ES"/>
           </a:p>
@@ -1594,7 +1595,7 @@
           <a:p>
             <a:fld id="{B3030C24-9424-B24A-8613-79990C3AA492}" type="datetimeFigureOut">
               <a:rPr lang="es-ES" smtClean="0"/>
-              <a:t>04/06/2020</a:t>
+              <a:t>11/06/2020</a:t>
             </a:fld>
             <a:endParaRPr lang="es-ES"/>
           </a:p>
@@ -2586,8 +2587,8 @@
         </p:nvSpPr>
         <p:spPr>
           <a:xfrm>
-            <a:off x="405245" y="332508"/>
-            <a:ext cx="7658101" cy="3077766"/>
+            <a:off x="477980" y="529936"/>
+            <a:ext cx="7678884" cy="3785652"/>
           </a:xfrm>
           <a:prstGeom prst="rect">
             <a:avLst/>
@@ -2602,43 +2603,35 @@
           <a:p>
             <a:pPr algn="just"/>
             <a:r>
-              <a:rPr lang="es-CO" sz="4000" b="1" dirty="0"/>
-              <a:t>Tecnológico: </a:t>
+              <a:rPr lang="es-CO" sz="3600" b="1" dirty="0" smtClean="0"/>
+              <a:t>Ambiental:</a:t>
+            </a:r>
+            <a:r>
+              <a:rPr lang="es-CO" sz="3600" dirty="0" smtClean="0"/>
+              <a:t> </a:t>
             </a:r>
           </a:p>
           <a:p>
             <a:pPr algn="just"/>
-            <a:endParaRPr lang="es-CO" sz="3200" b="1" dirty="0"/>
+            <a:endParaRPr lang="es-CO" sz="3600" dirty="0"/>
           </a:p>
           <a:p>
             <a:pPr algn="just"/>
-            <a:endParaRPr lang="es-CO" sz="3200" b="1" dirty="0"/>
+            <a:r>
+              <a:rPr lang="es-CO" sz="3200" dirty="0"/>
+              <a:t>Los materiales para el desarrollo de la manilla pueden ser no reciclables, pero al funcionar a largo plazo no genera un gran impacto ambiental.</a:t>
+            </a:r>
           </a:p>
           <a:p>
             <a:pPr algn="just"/>
-            <a:r>
-              <a:rPr lang="es-CO" sz="3600" dirty="0"/>
-              <a:t>Se </a:t>
-            </a:r>
-            <a:r>
-              <a:rPr lang="es-CO" sz="3600" dirty="0" smtClean="0"/>
-              <a:t>les </a:t>
-            </a:r>
-            <a:r>
-              <a:rPr lang="es-CO" sz="3600" dirty="0"/>
-              <a:t>implementará a las manillas ya existentes audio y geolocalización.</a:t>
-            </a:r>
-          </a:p>
-          <a:p>
-            <a:pPr algn="just"/>
-            <a:endParaRPr lang="es-CO" dirty="0"/>
+            <a:endParaRPr lang="es-CO" sz="4000" dirty="0"/>
           </a:p>
         </p:txBody>
       </p:sp>
     </p:spTree>
     <p:extLst>
       <p:ext uri="{BB962C8B-B14F-4D97-AF65-F5344CB8AC3E}">
-        <p14:creationId xmlns:p14="http://schemas.microsoft.com/office/powerpoint/2010/main" val="981732975"/>
+        <p14:creationId xmlns:p14="http://schemas.microsoft.com/office/powerpoint/2010/main" val="959297942"/>
       </p:ext>
     </p:extLst>
   </p:cSld>
@@ -2673,8 +2666,8 @@
         </p:nvSpPr>
         <p:spPr>
           <a:xfrm>
-            <a:off x="382867" y="249495"/>
-            <a:ext cx="4106005" cy="646331"/>
+            <a:off x="405245" y="332508"/>
+            <a:ext cx="7658101" cy="2677656"/>
           </a:xfrm>
           <a:prstGeom prst="rect">
             <a:avLst/>
@@ -2687,57 +2680,51 @@
           </a:bodyPr>
           <a:lstStyle/>
           <a:p>
-            <a:r>
-              <a:rPr lang="es-ES" sz="3600" b="1" dirty="0">
-                <a:solidFill>
-                  <a:schemeClr val="bg1"/>
-                </a:solidFill>
-              </a:rPr>
-              <a:t>Mapa de procesos</a:t>
-            </a:r>
-          </a:p>
-        </p:txBody>
-      </p:sp>
-      <p:pic>
-        <p:nvPicPr>
-          <p:cNvPr id="5" name="Imagen 4">
-            <a:extLst>
-              <a:ext uri="{FF2B5EF4-FFF2-40B4-BE49-F238E27FC236}">
-                <a16:creationId xmlns:a16="http://schemas.microsoft.com/office/drawing/2014/main" id="{E2C91A42-73B0-4048-914C-3CBE69CF462F}"/>
-              </a:ext>
-            </a:extLst>
-          </p:cNvPr>
-          <p:cNvPicPr>
-            <a:picLocks noChangeAspect="1"/>
-          </p:cNvPicPr>
-          <p:nvPr/>
-        </p:nvPicPr>
-        <p:blipFill>
-          <a:blip r:embed="rId2"/>
-          <a:stretch>
-            <a:fillRect/>
-          </a:stretch>
-        </p:blipFill>
-        <p:spPr>
-          <a:xfrm>
-            <a:off x="0" y="1050324"/>
-            <a:ext cx="9144000" cy="4093176"/>
-          </a:xfrm>
-          <a:prstGeom prst="rect">
-            <a:avLst/>
-          </a:prstGeom>
-        </p:spPr>
-      </p:pic>
+            <a:pPr algn="just"/>
+            <a:r>
+              <a:rPr lang="es-CO" sz="4000" b="1" dirty="0"/>
+              <a:t>Tecnológico: </a:t>
+            </a:r>
+          </a:p>
+          <a:p>
+            <a:pPr algn="just"/>
+            <a:endParaRPr lang="es-CO" sz="3200" b="1" dirty="0"/>
+          </a:p>
+          <a:p>
+            <a:pPr algn="just"/>
+            <a:r>
+              <a:rPr lang="es-CO" sz="3200" dirty="0"/>
+              <a:t>Se les implementará a las manillas ya existentes con código QR un audio con la información personal del usuario</a:t>
+            </a:r>
+            <a:r>
+              <a:rPr lang="es-CO" sz="3200" b="1" i="1" dirty="0"/>
+              <a:t>.</a:t>
+            </a:r>
+            <a:r>
+              <a:rPr lang="es-CO" sz="3200" b="1" dirty="0"/>
+              <a:t> </a:t>
+            </a:r>
+            <a:endParaRPr lang="es-CO" sz="3200" dirty="0"/>
+          </a:p>
+        </p:txBody>
+      </p:sp>
     </p:spTree>
     <p:extLst>
       <p:ext uri="{BB962C8B-B14F-4D97-AF65-F5344CB8AC3E}">
-        <p14:creationId xmlns:p14="http://schemas.microsoft.com/office/powerpoint/2010/main" val="1352640011"/>
+        <p14:creationId xmlns:p14="http://schemas.microsoft.com/office/powerpoint/2010/main" val="981732975"/>
       </p:ext>
     </p:extLst>
   </p:cSld>
   <p:clrMapOvr>
     <a:masterClrMapping/>
   </p:clrMapOvr>
+  <p:timing>
+    <p:tnLst>
+      <p:par>
+        <p:cTn id="1" dur="indefinite" restart="never" nodeType="tmRoot"/>
+      </p:par>
+    </p:tnLst>
+  </p:timing>
 </p:sld>
 </file>
 
@@ -2786,265 +2773,57 @@
                   <a:schemeClr val="bg1"/>
                 </a:solidFill>
               </a:rPr>
-              <a:t>Avances</a:t>
-            </a:r>
-          </a:p>
-        </p:txBody>
-      </p:sp>
-      <p:sp>
-        <p:nvSpPr>
-          <p:cNvPr id="3" name="Rectángulo 2"/>
-          <p:cNvSpPr/>
+              <a:t>Mapa de procesos</a:t>
+            </a:r>
+          </a:p>
+        </p:txBody>
+      </p:sp>
+      <p:pic>
+        <p:nvPicPr>
+          <p:cNvPr id="3" name="Imagen 2"/>
+          <p:cNvPicPr>
+            <a:picLocks noChangeAspect="1"/>
+          </p:cNvPicPr>
           <p:nvPr/>
-        </p:nvSpPr>
-        <p:spPr>
-          <a:xfrm>
-            <a:off x="289349" y="1164206"/>
-            <a:ext cx="8033769" cy="3979294"/>
+        </p:nvPicPr>
+        <p:blipFill rotWithShape="1">
+          <a:blip r:embed="rId2">
+            <a:extLst>
+              <a:ext uri="{28A0092B-C50C-407E-A947-70E740481C1C}">
+                <a14:useLocalDpi xmlns:a14="http://schemas.microsoft.com/office/drawing/2010/main" val="0"/>
+              </a:ext>
+            </a:extLst>
+          </a:blip>
+          <a:srcRect l="4669" t="5344" r="5572" b="6107"/>
+          <a:stretch/>
+        </p:blipFill>
+        <p:spPr>
+          <a:xfrm>
+            <a:off x="1395566" y="1101436"/>
+            <a:ext cx="6335270" cy="3948545"/>
           </a:xfrm>
           <a:prstGeom prst="rect">
             <a:avLst/>
           </a:prstGeom>
         </p:spPr>
-        <p:txBody>
-          <a:bodyPr wrap="square">
-            <a:spAutoFit/>
-          </a:bodyPr>
-          <a:lstStyle/>
-          <a:p>
-            <a:pPr>
-              <a:lnSpc>
-                <a:spcPct val="107000"/>
-              </a:lnSpc>
-              <a:spcAft>
-                <a:spcPts val="800"/>
-              </a:spcAft>
-            </a:pPr>
-            <a:r>
-              <a:rPr lang="es-MX" dirty="0">
-                <a:latin typeface="Calibri" panose="020F0502020204030204" pitchFamily="34" charset="0"/>
-                <a:ea typeface="Calibri" panose="020F0502020204030204" pitchFamily="34" charset="0"/>
-                <a:cs typeface="Times New Roman" panose="02020603050405020304" pitchFamily="18" charset="0"/>
-              </a:rPr>
-              <a:t>Los cambios y avances que ha tenido nuestro proyecto son las siguientes:</a:t>
-            </a:r>
-          </a:p>
-          <a:p>
-            <a:pPr marL="285750" indent="-285750">
-              <a:lnSpc>
-                <a:spcPct val="107000"/>
-              </a:lnSpc>
-              <a:spcAft>
-                <a:spcPts val="800"/>
-              </a:spcAft>
-              <a:buFont typeface="Arial" panose="020B0604020202020204" pitchFamily="34" charset="0"/>
-              <a:buChar char="•"/>
-            </a:pPr>
-            <a:r>
-              <a:rPr lang="es-MX" dirty="0">
-                <a:latin typeface="Calibri" panose="020F0502020204030204" pitchFamily="34" charset="0"/>
-                <a:ea typeface="Calibri" panose="020F0502020204030204" pitchFamily="34" charset="0"/>
-                <a:cs typeface="Times New Roman" panose="02020603050405020304" pitchFamily="18" charset="0"/>
-              </a:rPr>
-              <a:t>Realizamos la encuesta.</a:t>
-            </a:r>
-          </a:p>
-          <a:p>
-            <a:pPr marL="285750" indent="-285750">
-              <a:lnSpc>
-                <a:spcPct val="107000"/>
-              </a:lnSpc>
-              <a:spcAft>
-                <a:spcPts val="800"/>
-              </a:spcAft>
-              <a:buFont typeface="Arial" panose="020B0604020202020204" pitchFamily="34" charset="0"/>
-              <a:buChar char="•"/>
-            </a:pPr>
-            <a:r>
-              <a:rPr lang="es-MX" dirty="0">
-                <a:latin typeface="Calibri" panose="020F0502020204030204" pitchFamily="34" charset="0"/>
-                <a:ea typeface="Calibri" panose="020F0502020204030204" pitchFamily="34" charset="0"/>
-                <a:cs typeface="Times New Roman" panose="02020603050405020304" pitchFamily="18" charset="0"/>
-              </a:rPr>
-              <a:t>Hicimos la ficha técnica de la encuesta.</a:t>
-            </a:r>
-          </a:p>
-          <a:p>
-            <a:pPr marL="285750" indent="-285750">
-              <a:lnSpc>
-                <a:spcPct val="107000"/>
-              </a:lnSpc>
-              <a:spcAft>
-                <a:spcPts val="800"/>
-              </a:spcAft>
-              <a:buFont typeface="Arial" panose="020B0604020202020204" pitchFamily="34" charset="0"/>
-              <a:buChar char="•"/>
-            </a:pPr>
-            <a:r>
-              <a:rPr lang="es-MX" dirty="0">
-                <a:latin typeface="Calibri" panose="020F0502020204030204" pitchFamily="34" charset="0"/>
-                <a:ea typeface="Calibri" panose="020F0502020204030204" pitchFamily="34" charset="0"/>
-                <a:cs typeface="Times New Roman" panose="02020603050405020304" pitchFamily="18" charset="0"/>
-              </a:rPr>
-              <a:t>Agregamos y organizamos los objetivos específicos.</a:t>
-            </a:r>
-            <a:endParaRPr lang="es-CO" dirty="0">
-              <a:latin typeface="Calibri" panose="020F0502020204030204" pitchFamily="34" charset="0"/>
-              <a:ea typeface="Calibri" panose="020F0502020204030204" pitchFamily="34" charset="0"/>
-              <a:cs typeface="Times New Roman" panose="02020603050405020304" pitchFamily="18" charset="0"/>
-            </a:endParaRPr>
-          </a:p>
-          <a:p>
-            <a:pPr marL="285750" indent="-285750">
-              <a:lnSpc>
-                <a:spcPct val="107000"/>
-              </a:lnSpc>
-              <a:spcAft>
-                <a:spcPts val="800"/>
-              </a:spcAft>
-              <a:buFont typeface="Arial" panose="020B0604020202020204" pitchFamily="34" charset="0"/>
-              <a:buChar char="•"/>
-            </a:pPr>
-            <a:r>
-              <a:rPr lang="es-MX" dirty="0">
-                <a:latin typeface="Calibri" panose="020F0502020204030204" pitchFamily="34" charset="0"/>
-                <a:ea typeface="Calibri" panose="020F0502020204030204" pitchFamily="34" charset="0"/>
-                <a:cs typeface="Times New Roman" panose="02020603050405020304" pitchFamily="18" charset="0"/>
-              </a:rPr>
-              <a:t>Modificamos el mapa mental.</a:t>
-            </a:r>
-            <a:endParaRPr lang="es-CO" dirty="0">
-              <a:latin typeface="Calibri" panose="020F0502020204030204" pitchFamily="34" charset="0"/>
-              <a:ea typeface="Calibri" panose="020F0502020204030204" pitchFamily="34" charset="0"/>
-              <a:cs typeface="Times New Roman" panose="02020603050405020304" pitchFamily="18" charset="0"/>
-            </a:endParaRPr>
-          </a:p>
-          <a:p>
-            <a:pPr marL="285750" indent="-285750">
-              <a:lnSpc>
-                <a:spcPct val="107000"/>
-              </a:lnSpc>
-              <a:spcAft>
-                <a:spcPts val="800"/>
-              </a:spcAft>
-              <a:buFont typeface="Arial" panose="020B0604020202020204" pitchFamily="34" charset="0"/>
-              <a:buChar char="•"/>
-            </a:pPr>
-            <a:r>
-              <a:rPr lang="es-MX" dirty="0">
-                <a:latin typeface="Calibri" panose="020F0502020204030204" pitchFamily="34" charset="0"/>
-                <a:ea typeface="Calibri" panose="020F0502020204030204" pitchFamily="34" charset="0"/>
-                <a:cs typeface="Times New Roman" panose="02020603050405020304" pitchFamily="18" charset="0"/>
-              </a:rPr>
-              <a:t>Agregamos unas palabras al glosario.</a:t>
-            </a:r>
-          </a:p>
-          <a:p>
-            <a:pPr marL="285750" indent="-285750">
-              <a:lnSpc>
-                <a:spcPct val="107000"/>
-              </a:lnSpc>
-              <a:spcAft>
-                <a:spcPts val="800"/>
-              </a:spcAft>
-              <a:buFont typeface="Arial" panose="020B0604020202020204" pitchFamily="34" charset="0"/>
-              <a:buChar char="•"/>
-            </a:pPr>
-            <a:r>
-              <a:rPr lang="es-MX" dirty="0">
-                <a:latin typeface="Calibri" panose="020F0502020204030204" pitchFamily="34" charset="0"/>
-                <a:ea typeface="Calibri" panose="020F0502020204030204" pitchFamily="34" charset="0"/>
-                <a:cs typeface="Times New Roman" panose="02020603050405020304" pitchFamily="18" charset="0"/>
-              </a:rPr>
-              <a:t>Agregamos los requisitos funcionales y no funcionales.</a:t>
-            </a:r>
-          </a:p>
-          <a:p>
-            <a:pPr marL="285750" indent="-285750">
-              <a:lnSpc>
-                <a:spcPct val="107000"/>
-              </a:lnSpc>
-              <a:spcAft>
-                <a:spcPts val="800"/>
-              </a:spcAft>
-              <a:buFont typeface="Arial" panose="020B0604020202020204" pitchFamily="34" charset="0"/>
-              <a:buChar char="•"/>
-            </a:pPr>
-            <a:r>
-              <a:rPr lang="es-MX" dirty="0">
-                <a:latin typeface="Calibri" panose="020F0502020204030204" pitchFamily="34" charset="0"/>
-                <a:ea typeface="Calibri" panose="020F0502020204030204" pitchFamily="34" charset="0"/>
-                <a:cs typeface="Times New Roman" panose="02020603050405020304" pitchFamily="18" charset="0"/>
-              </a:rPr>
-              <a:t>Hicimos el mapa conceptual de los requisitos funcionales y no funcionales. </a:t>
-            </a:r>
-            <a:endParaRPr lang="es-CO" dirty="0">
-              <a:latin typeface="Calibri" panose="020F0502020204030204" pitchFamily="34" charset="0"/>
-              <a:ea typeface="Calibri" panose="020F0502020204030204" pitchFamily="34" charset="0"/>
-              <a:cs typeface="Times New Roman" panose="02020603050405020304" pitchFamily="18" charset="0"/>
-            </a:endParaRPr>
-          </a:p>
-          <a:p>
-            <a:pPr marL="285750" indent="-285750">
-              <a:lnSpc>
-                <a:spcPct val="107000"/>
-              </a:lnSpc>
-              <a:spcAft>
-                <a:spcPts val="800"/>
-              </a:spcAft>
-              <a:buFont typeface="Arial" panose="020B0604020202020204" pitchFamily="34" charset="0"/>
-              <a:buChar char="•"/>
-            </a:pPr>
-            <a:r>
-              <a:rPr lang="es-MX" dirty="0">
-                <a:latin typeface="Calibri" panose="020F0502020204030204" pitchFamily="34" charset="0"/>
-                <a:ea typeface="Calibri" panose="020F0502020204030204" pitchFamily="34" charset="0"/>
-                <a:cs typeface="Times New Roman" panose="02020603050405020304" pitchFamily="18" charset="0"/>
-              </a:rPr>
-              <a:t>Modificamos el mapa de procesos.</a:t>
-            </a:r>
-          </a:p>
-          <a:p>
-            <a:pPr marL="285750" indent="-285750">
-              <a:lnSpc>
-                <a:spcPct val="107000"/>
-              </a:lnSpc>
-              <a:spcAft>
-                <a:spcPts val="800"/>
-              </a:spcAft>
-              <a:buFont typeface="Arial" panose="020B0604020202020204" pitchFamily="34" charset="0"/>
-              <a:buChar char="•"/>
-            </a:pPr>
-            <a:r>
-              <a:rPr lang="es-MX" dirty="0">
-                <a:latin typeface="Calibri" panose="020F0502020204030204" pitchFamily="34" charset="0"/>
-                <a:ea typeface="Calibri" panose="020F0502020204030204" pitchFamily="34" charset="0"/>
-                <a:cs typeface="Times New Roman" panose="02020603050405020304" pitchFamily="18" charset="0"/>
-              </a:rPr>
-              <a:t>Creamos un repositorio en </a:t>
-            </a:r>
-            <a:r>
-              <a:rPr lang="es-CO" dirty="0"/>
-              <a:t>GitHub, y subimos los archivos.</a:t>
-            </a:r>
-            <a:endParaRPr lang="es-CO" dirty="0">
-              <a:latin typeface="Calibri" panose="020F0502020204030204" pitchFamily="34" charset="0"/>
-              <a:ea typeface="Calibri" panose="020F0502020204030204" pitchFamily="34" charset="0"/>
-              <a:cs typeface="Times New Roman" panose="02020603050405020304" pitchFamily="18" charset="0"/>
-            </a:endParaRPr>
-          </a:p>
-        </p:txBody>
-      </p:sp>
+      </p:pic>
     </p:spTree>
     <p:extLst>
       <p:ext uri="{BB962C8B-B14F-4D97-AF65-F5344CB8AC3E}">
-        <p14:creationId xmlns:p14="http://schemas.microsoft.com/office/powerpoint/2010/main" val="2711448748"/>
+        <p14:creationId xmlns:p14="http://schemas.microsoft.com/office/powerpoint/2010/main" val="1352640011"/>
       </p:ext>
     </p:extLst>
   </p:cSld>
   <p:clrMapOvr>
     <a:masterClrMapping/>
   </p:clrMapOvr>
+  <p:timing>
+    <p:tnLst>
+      <p:par>
+        <p:cTn id="1" dur="indefinite" restart="never" nodeType="tmRoot"/>
+      </p:par>
+    </p:tnLst>
+  </p:timing>
 </p:sld>
 </file>
 
@@ -3067,20 +2846,14 @@
       </p:grpSpPr>
       <p:sp>
         <p:nvSpPr>
-          <p:cNvPr id="3" name="CuadroTexto 2">
-            <a:extLst>
-              <a:ext uri="{FF2B5EF4-FFF2-40B4-BE49-F238E27FC236}">
-                <a16:creationId xmlns:a16="http://schemas.microsoft.com/office/drawing/2014/main" id="{8C5DF779-19B5-443A-B2F4-3ACA11485615}"/>
-              </a:ext>
-            </a:extLst>
-          </p:cNvPr>
+          <p:cNvPr id="2" name="CuadroTexto 1"/>
           <p:cNvSpPr txBox="1"/>
           <p:nvPr/>
         </p:nvSpPr>
         <p:spPr>
           <a:xfrm>
-            <a:off x="407773" y="1482810"/>
-            <a:ext cx="8148577" cy="2308324"/>
+            <a:off x="382867" y="249495"/>
+            <a:ext cx="4106005" cy="646331"/>
           </a:xfrm>
           <a:prstGeom prst="rect">
             <a:avLst/>
@@ -3088,103 +2861,283 @@
           <a:noFill/>
         </p:spPr>
         <p:txBody>
-          <a:bodyPr wrap="none" rtlCol="0">
+          <a:bodyPr wrap="square" rtlCol="0">
             <a:spAutoFit/>
           </a:bodyPr>
           <a:lstStyle/>
           <a:p>
+            <a:r>
+              <a:rPr lang="es-ES" sz="3600" b="1" dirty="0">
+                <a:solidFill>
+                  <a:schemeClr val="bg1"/>
+                </a:solidFill>
+              </a:rPr>
+              <a:t>Avances</a:t>
+            </a:r>
+          </a:p>
+        </p:txBody>
+      </p:sp>
+      <p:sp>
+        <p:nvSpPr>
+          <p:cNvPr id="3" name="Rectángulo 2"/>
+          <p:cNvSpPr/>
+          <p:nvPr/>
+        </p:nvSpPr>
+        <p:spPr>
+          <a:xfrm>
+            <a:off x="289349" y="1164206"/>
+            <a:ext cx="8033769" cy="3979294"/>
+          </a:xfrm>
+          <a:prstGeom prst="rect">
+            <a:avLst/>
+          </a:prstGeom>
+        </p:spPr>
+        <p:txBody>
+          <a:bodyPr wrap="square">
+            <a:spAutoFit/>
+          </a:bodyPr>
+          <a:lstStyle/>
+          <a:p>
+            <a:pPr>
+              <a:lnSpc>
+                <a:spcPct val="107000"/>
+              </a:lnSpc>
+              <a:spcAft>
+                <a:spcPts val="800"/>
+              </a:spcAft>
+            </a:pPr>
+            <a:r>
+              <a:rPr lang="es-MX" dirty="0">
+                <a:latin typeface="Calibri" panose="020F0502020204030204" pitchFamily="34" charset="0"/>
+                <a:ea typeface="Calibri" panose="020F0502020204030204" pitchFamily="34" charset="0"/>
+                <a:cs typeface="Times New Roman" panose="02020603050405020304" pitchFamily="18" charset="0"/>
+              </a:rPr>
+              <a:t>Los cambios y avances que ha tenido nuestro proyecto son las siguientes:</a:t>
+            </a:r>
+          </a:p>
+          <a:p>
             <a:pPr marL="285750" indent="-285750">
+              <a:lnSpc>
+                <a:spcPct val="107000"/>
+              </a:lnSpc>
+              <a:spcAft>
+                <a:spcPts val="800"/>
+              </a:spcAft>
               <a:buFont typeface="Arial" panose="020B0604020202020204" pitchFamily="34" charset="0"/>
               <a:buChar char="•"/>
             </a:pPr>
             <a:r>
-              <a:rPr lang="es-MX" dirty="0"/>
-              <a:t>Decidimos implementar la pulsera para todas las personas que deseen  adquirirlo.</a:t>
+              <a:rPr lang="es-MX" dirty="0">
+                <a:latin typeface="Calibri" panose="020F0502020204030204" pitchFamily="34" charset="0"/>
+                <a:ea typeface="Calibri" panose="020F0502020204030204" pitchFamily="34" charset="0"/>
+                <a:cs typeface="Times New Roman" panose="02020603050405020304" pitchFamily="18" charset="0"/>
+              </a:rPr>
+              <a:t>Realizamos la encuesta.</a:t>
             </a:r>
           </a:p>
           <a:p>
             <a:pPr marL="285750" indent="-285750">
+              <a:lnSpc>
+                <a:spcPct val="107000"/>
+              </a:lnSpc>
+              <a:spcAft>
+                <a:spcPts val="800"/>
+              </a:spcAft>
               <a:buFont typeface="Arial" panose="020B0604020202020204" pitchFamily="34" charset="0"/>
               <a:buChar char="•"/>
             </a:pPr>
             <a:r>
-              <a:rPr lang="es-MX" dirty="0"/>
-              <a:t>Editamos el contenido de las diapositivas.</a:t>
+              <a:rPr lang="es-MX" dirty="0">
+                <a:latin typeface="Calibri" panose="020F0502020204030204" pitchFamily="34" charset="0"/>
+                <a:ea typeface="Calibri" panose="020F0502020204030204" pitchFamily="34" charset="0"/>
+                <a:cs typeface="Times New Roman" panose="02020603050405020304" pitchFamily="18" charset="0"/>
+              </a:rPr>
+              <a:t>Hicimos la ficha técnica de la encuesta.</a:t>
             </a:r>
           </a:p>
           <a:p>
             <a:pPr marL="285750" indent="-285750">
+              <a:lnSpc>
+                <a:spcPct val="107000"/>
+              </a:lnSpc>
+              <a:spcAft>
+                <a:spcPts val="800"/>
+              </a:spcAft>
               <a:buFont typeface="Arial" panose="020B0604020202020204" pitchFamily="34" charset="0"/>
               <a:buChar char="•"/>
             </a:pPr>
             <a:r>
-              <a:rPr lang="es-MX" dirty="0"/>
-              <a:t>Editamos el mapa mental, de procesos y el árbol de problemas. </a:t>
-            </a:r>
+              <a:rPr lang="es-MX" dirty="0">
+                <a:latin typeface="Calibri" panose="020F0502020204030204" pitchFamily="34" charset="0"/>
+                <a:ea typeface="Calibri" panose="020F0502020204030204" pitchFamily="34" charset="0"/>
+                <a:cs typeface="Times New Roman" panose="02020603050405020304" pitchFamily="18" charset="0"/>
+              </a:rPr>
+              <a:t>Agregamos y organizamos los objetivos específicos.</a:t>
+            </a:r>
+            <a:endParaRPr lang="es-CO" dirty="0">
+              <a:latin typeface="Calibri" panose="020F0502020204030204" pitchFamily="34" charset="0"/>
+              <a:ea typeface="Calibri" panose="020F0502020204030204" pitchFamily="34" charset="0"/>
+              <a:cs typeface="Times New Roman" panose="02020603050405020304" pitchFamily="18" charset="0"/>
+            </a:endParaRPr>
           </a:p>
           <a:p>
             <a:pPr marL="285750" indent="-285750">
+              <a:lnSpc>
+                <a:spcPct val="107000"/>
+              </a:lnSpc>
+              <a:spcAft>
+                <a:spcPts val="800"/>
+              </a:spcAft>
               <a:buFont typeface="Arial" panose="020B0604020202020204" pitchFamily="34" charset="0"/>
               <a:buChar char="•"/>
             </a:pPr>
             <a:r>
-              <a:rPr lang="es-MX" dirty="0"/>
-              <a:t>También editamos el documento de Word</a:t>
-            </a:r>
-            <a:r>
-              <a:rPr lang="es-MX" dirty="0" smtClean="0"/>
-              <a:t>.</a:t>
-            </a:r>
+              <a:rPr lang="es-MX" dirty="0">
+                <a:latin typeface="Calibri" panose="020F0502020204030204" pitchFamily="34" charset="0"/>
+                <a:ea typeface="Calibri" panose="020F0502020204030204" pitchFamily="34" charset="0"/>
+                <a:cs typeface="Times New Roman" panose="02020603050405020304" pitchFamily="18" charset="0"/>
+              </a:rPr>
+              <a:t>Modificamos el mapa mental.</a:t>
+            </a:r>
+            <a:endParaRPr lang="es-CO" dirty="0">
+              <a:latin typeface="Calibri" panose="020F0502020204030204" pitchFamily="34" charset="0"/>
+              <a:ea typeface="Calibri" panose="020F0502020204030204" pitchFamily="34" charset="0"/>
+              <a:cs typeface="Times New Roman" panose="02020603050405020304" pitchFamily="18" charset="0"/>
+            </a:endParaRPr>
           </a:p>
           <a:p>
             <a:pPr marL="285750" indent="-285750">
+              <a:lnSpc>
+                <a:spcPct val="107000"/>
+              </a:lnSpc>
+              <a:spcAft>
+                <a:spcPts val="800"/>
+              </a:spcAft>
               <a:buFont typeface="Arial" panose="020B0604020202020204" pitchFamily="34" charset="0"/>
               <a:buChar char="•"/>
             </a:pPr>
-            <a:endParaRPr lang="es-MX" dirty="0"/>
+            <a:r>
+              <a:rPr lang="es-MX" dirty="0">
+                <a:latin typeface="Calibri" panose="020F0502020204030204" pitchFamily="34" charset="0"/>
+                <a:ea typeface="Calibri" panose="020F0502020204030204" pitchFamily="34" charset="0"/>
+                <a:cs typeface="Times New Roman" panose="02020603050405020304" pitchFamily="18" charset="0"/>
+              </a:rPr>
+              <a:t>Agregamos unas palabras al glosario.</a:t>
+            </a:r>
           </a:p>
           <a:p>
             <a:pPr marL="285750" indent="-285750">
+              <a:lnSpc>
+                <a:spcPct val="107000"/>
+              </a:lnSpc>
+              <a:spcAft>
+                <a:spcPts val="800"/>
+              </a:spcAft>
               <a:buFont typeface="Arial" panose="020B0604020202020204" pitchFamily="34" charset="0"/>
               <a:buChar char="•"/>
             </a:pPr>
             <a:r>
-              <a:rPr lang="es-MX" dirty="0" smtClean="0"/>
-              <a:t>Corregimos el proyecto.</a:t>
+              <a:rPr lang="es-MX" dirty="0">
+                <a:latin typeface="Calibri" panose="020F0502020204030204" pitchFamily="34" charset="0"/>
+                <a:ea typeface="Calibri" panose="020F0502020204030204" pitchFamily="34" charset="0"/>
+                <a:cs typeface="Times New Roman" panose="02020603050405020304" pitchFamily="18" charset="0"/>
+              </a:rPr>
+              <a:t>Agregamos los requisitos funcionales y no funcionales.</a:t>
             </a:r>
           </a:p>
           <a:p>
             <a:pPr marL="285750" indent="-285750">
+              <a:lnSpc>
+                <a:spcPct val="107000"/>
+              </a:lnSpc>
+              <a:spcAft>
+                <a:spcPts val="800"/>
+              </a:spcAft>
               <a:buFont typeface="Arial" panose="020B0604020202020204" pitchFamily="34" charset="0"/>
               <a:buChar char="•"/>
             </a:pPr>
             <a:r>
-              <a:rPr lang="es-MX" dirty="0" smtClean="0"/>
-              <a:t>Historia de usuario</a:t>
-            </a:r>
+              <a:rPr lang="es-MX" dirty="0">
+                <a:latin typeface="Calibri" panose="020F0502020204030204" pitchFamily="34" charset="0"/>
+                <a:ea typeface="Calibri" panose="020F0502020204030204" pitchFamily="34" charset="0"/>
+                <a:cs typeface="Times New Roman" panose="02020603050405020304" pitchFamily="18" charset="0"/>
+              </a:rPr>
+              <a:t>Hicimos el mapa conceptual de los requisitos funcionales y no funcionales. </a:t>
+            </a:r>
+            <a:endParaRPr lang="es-CO" dirty="0">
+              <a:latin typeface="Calibri" panose="020F0502020204030204" pitchFamily="34" charset="0"/>
+              <a:ea typeface="Calibri" panose="020F0502020204030204" pitchFamily="34" charset="0"/>
+              <a:cs typeface="Times New Roman" panose="02020603050405020304" pitchFamily="18" charset="0"/>
+            </a:endParaRPr>
           </a:p>
           <a:p>
             <a:pPr marL="285750" indent="-285750">
+              <a:lnSpc>
+                <a:spcPct val="107000"/>
+              </a:lnSpc>
+              <a:spcAft>
+                <a:spcPts val="800"/>
+              </a:spcAft>
               <a:buFont typeface="Arial" panose="020B0604020202020204" pitchFamily="34" charset="0"/>
               <a:buChar char="•"/>
             </a:pPr>
             <a:r>
-              <a:rPr lang="es-MX" dirty="0" smtClean="0"/>
-              <a:t>Casos de usos.</a:t>
-            </a:r>
+              <a:rPr lang="es-MX" dirty="0">
+                <a:latin typeface="Calibri" panose="020F0502020204030204" pitchFamily="34" charset="0"/>
+                <a:ea typeface="Calibri" panose="020F0502020204030204" pitchFamily="34" charset="0"/>
+                <a:cs typeface="Times New Roman" panose="02020603050405020304" pitchFamily="18" charset="0"/>
+              </a:rPr>
+              <a:t>Modificamos el mapa de procesos.</a:t>
+            </a:r>
+          </a:p>
+          <a:p>
+            <a:pPr marL="285750" indent="-285750">
+              <a:lnSpc>
+                <a:spcPct val="107000"/>
+              </a:lnSpc>
+              <a:spcAft>
+                <a:spcPts val="800"/>
+              </a:spcAft>
+              <a:buFont typeface="Arial" panose="020B0604020202020204" pitchFamily="34" charset="0"/>
+              <a:buChar char="•"/>
+            </a:pPr>
+            <a:r>
+              <a:rPr lang="es-MX" dirty="0">
+                <a:latin typeface="Calibri" panose="020F0502020204030204" pitchFamily="34" charset="0"/>
+                <a:ea typeface="Calibri" panose="020F0502020204030204" pitchFamily="34" charset="0"/>
+                <a:cs typeface="Times New Roman" panose="02020603050405020304" pitchFamily="18" charset="0"/>
+              </a:rPr>
+              <a:t>Creamos un repositorio en </a:t>
+            </a:r>
+            <a:r>
+              <a:rPr lang="es-CO" dirty="0"/>
+              <a:t>GitHub, y subimos los archivos.</a:t>
+            </a:r>
+            <a:endParaRPr lang="es-CO" dirty="0">
+              <a:latin typeface="Calibri" panose="020F0502020204030204" pitchFamily="34" charset="0"/>
+              <a:ea typeface="Calibri" panose="020F0502020204030204" pitchFamily="34" charset="0"/>
+              <a:cs typeface="Times New Roman" panose="02020603050405020304" pitchFamily="18" charset="0"/>
+            </a:endParaRPr>
           </a:p>
         </p:txBody>
       </p:sp>
     </p:spTree>
     <p:extLst>
       <p:ext uri="{BB962C8B-B14F-4D97-AF65-F5344CB8AC3E}">
-        <p14:creationId xmlns:p14="http://schemas.microsoft.com/office/powerpoint/2010/main" val="470859506"/>
+        <p14:creationId xmlns:p14="http://schemas.microsoft.com/office/powerpoint/2010/main" val="2711448748"/>
       </p:ext>
     </p:extLst>
   </p:cSld>
   <p:clrMapOvr>
     <a:masterClrMapping/>
   </p:clrMapOvr>
+  <p:timing>
+    <p:tnLst>
+      <p:par>
+        <p:cTn id="1" dur="indefinite" restart="never" nodeType="tmRoot"/>
+      </p:par>
+    </p:tnLst>
+  </p:timing>
 </p:sld>
 </file>
 
@@ -3207,68 +3160,118 @@
       </p:grpSpPr>
       <p:sp>
         <p:nvSpPr>
-          <p:cNvPr id="2" name="Rectángulo 1"/>
-          <p:cNvSpPr/>
+          <p:cNvPr id="3" name="CuadroTexto 2">
+            <a:extLst>
+              <a:ext uri="{FF2B5EF4-FFF2-40B4-BE49-F238E27FC236}">
+                <a16:creationId xmlns:a16="http://schemas.microsoft.com/office/drawing/2014/main" id="{8C5DF779-19B5-443A-B2F4-3ACA11485615}"/>
+              </a:ext>
+            </a:extLst>
+          </p:cNvPr>
+          <p:cNvSpPr txBox="1"/>
           <p:nvPr/>
         </p:nvSpPr>
         <p:spPr>
           <a:xfrm>
-            <a:off x="1908835" y="786884"/>
-            <a:ext cx="3975512" cy="369332"/>
+            <a:off x="407773" y="1482810"/>
+            <a:ext cx="8148577" cy="2308324"/>
           </a:xfrm>
           <a:prstGeom prst="rect">
             <a:avLst/>
           </a:prstGeom>
-        </p:spPr>
-        <p:txBody>
-          <a:bodyPr wrap="none">
+          <a:noFill/>
+        </p:spPr>
+        <p:txBody>
+          <a:bodyPr wrap="none" rtlCol="0">
             <a:spAutoFit/>
           </a:bodyPr>
           <a:lstStyle/>
           <a:p>
-            <a:r>
-              <a:rPr lang="es-CO" dirty="0">
-                <a:hlinkClick r:id="rId2"/>
-              </a:rPr>
-              <a:t>https://github.com/Dalvarez491/IdHand</a:t>
-            </a:r>
-            <a:endParaRPr lang="es-CO" dirty="0"/>
-          </a:p>
-        </p:txBody>
-      </p:sp>
-      <p:pic>
-        <p:nvPicPr>
-          <p:cNvPr id="4" name="Imagen 3"/>
-          <p:cNvPicPr>
-            <a:picLocks noChangeAspect="1"/>
-          </p:cNvPicPr>
-          <p:nvPr/>
-        </p:nvPicPr>
-        <p:blipFill rotWithShape="1">
-          <a:blip r:embed="rId3">
-            <a:extLst>
-              <a:ext uri="{28A0092B-C50C-407E-A947-70E740481C1C}">
-                <a14:useLocalDpi xmlns:a14="http://schemas.microsoft.com/office/drawing/2010/main" val="0"/>
-              </a:ext>
-            </a:extLst>
-          </a:blip>
-          <a:srcRect l="8181" t="4826" r="11250" b="22209"/>
-          <a:stretch/>
-        </p:blipFill>
-        <p:spPr>
-          <a:xfrm>
-            <a:off x="1981572" y="1156216"/>
-            <a:ext cx="6203375" cy="3158559"/>
-          </a:xfrm>
-          <a:prstGeom prst="rect">
-            <a:avLst/>
-          </a:prstGeom>
-        </p:spPr>
-      </p:pic>
+            <a:pPr marL="285750" indent="-285750">
+              <a:buFont typeface="Arial" panose="020B0604020202020204" pitchFamily="34" charset="0"/>
+              <a:buChar char="•"/>
+            </a:pPr>
+            <a:r>
+              <a:rPr lang="es-MX" dirty="0"/>
+              <a:t>Decidimos implementar la pulsera para todas las personas que deseen  adquirirlo.</a:t>
+            </a:r>
+          </a:p>
+          <a:p>
+            <a:pPr marL="285750" indent="-285750">
+              <a:buFont typeface="Arial" panose="020B0604020202020204" pitchFamily="34" charset="0"/>
+              <a:buChar char="•"/>
+            </a:pPr>
+            <a:r>
+              <a:rPr lang="es-MX" dirty="0"/>
+              <a:t>Editamos el contenido de las diapositivas.</a:t>
+            </a:r>
+          </a:p>
+          <a:p>
+            <a:pPr marL="285750" indent="-285750">
+              <a:buFont typeface="Arial" panose="020B0604020202020204" pitchFamily="34" charset="0"/>
+              <a:buChar char="•"/>
+            </a:pPr>
+            <a:r>
+              <a:rPr lang="es-MX" dirty="0"/>
+              <a:t>Editamos el mapa mental, de procesos y el árbol de problemas. </a:t>
+            </a:r>
+          </a:p>
+          <a:p>
+            <a:pPr marL="285750" indent="-285750">
+              <a:buFont typeface="Arial" panose="020B0604020202020204" pitchFamily="34" charset="0"/>
+              <a:buChar char="•"/>
+            </a:pPr>
+            <a:r>
+              <a:rPr lang="es-MX" dirty="0"/>
+              <a:t>También editamos el documento de Word</a:t>
+            </a:r>
+            <a:r>
+              <a:rPr lang="es-MX" dirty="0" smtClean="0"/>
+              <a:t>.</a:t>
+            </a:r>
+          </a:p>
+          <a:p>
+            <a:pPr marL="285750" indent="-285750">
+              <a:buFont typeface="Arial" panose="020B0604020202020204" pitchFamily="34" charset="0"/>
+              <a:buChar char="•"/>
+            </a:pPr>
+            <a:endParaRPr lang="es-MX" dirty="0"/>
+          </a:p>
+          <a:p>
+            <a:pPr marL="285750" indent="-285750">
+              <a:buFont typeface="Arial" panose="020B0604020202020204" pitchFamily="34" charset="0"/>
+              <a:buChar char="•"/>
+            </a:pPr>
+            <a:r>
+              <a:rPr lang="es-MX" dirty="0" smtClean="0"/>
+              <a:t>Corregimos el proyecto.</a:t>
+            </a:r>
+          </a:p>
+          <a:p>
+            <a:pPr marL="285750" indent="-285750">
+              <a:buFont typeface="Arial" panose="020B0604020202020204" pitchFamily="34" charset="0"/>
+              <a:buChar char="•"/>
+            </a:pPr>
+            <a:r>
+              <a:rPr lang="es-MX" dirty="0" smtClean="0"/>
+              <a:t>Historia de usuario</a:t>
+            </a:r>
+          </a:p>
+          <a:p>
+            <a:pPr marL="285750" indent="-285750">
+              <a:buFont typeface="Arial" panose="020B0604020202020204" pitchFamily="34" charset="0"/>
+              <a:buChar char="•"/>
+            </a:pPr>
+            <a:r>
+              <a:rPr lang="es-MX" dirty="0" smtClean="0"/>
+              <a:t>Casos de usos.</a:t>
+            </a:r>
+          </a:p>
+        </p:txBody>
+      </p:sp>
     </p:spTree>
     <p:extLst>
       <p:ext uri="{BB962C8B-B14F-4D97-AF65-F5344CB8AC3E}">
-        <p14:creationId xmlns:p14="http://schemas.microsoft.com/office/powerpoint/2010/main" val="2335984454"/>
+        <p14:creationId xmlns:p14="http://schemas.microsoft.com/office/powerpoint/2010/main" val="470859506"/>
       </p:ext>
     </p:extLst>
   </p:cSld>
@@ -3380,6 +3383,96 @@
 </file>
 
 <file path=ppt/slides/slide20.xml><?xml version="1.0" encoding="utf-8"?>
+<p:sld xmlns:a="http://schemas.openxmlformats.org/drawingml/2006/main" xmlns:r="http://schemas.openxmlformats.org/officeDocument/2006/relationships" xmlns:p="http://schemas.openxmlformats.org/presentationml/2006/main">
+  <p:cSld>
+    <p:spTree>
+      <p:nvGrpSpPr>
+        <p:cNvPr id="1" name=""/>
+        <p:cNvGrpSpPr/>
+        <p:nvPr/>
+      </p:nvGrpSpPr>
+      <p:grpSpPr>
+        <a:xfrm>
+          <a:off x="0" y="0"/>
+          <a:ext cx="0" cy="0"/>
+          <a:chOff x="0" y="0"/>
+          <a:chExt cx="0" cy="0"/>
+        </a:xfrm>
+      </p:grpSpPr>
+      <p:sp>
+        <p:nvSpPr>
+          <p:cNvPr id="2" name="Rectángulo 1"/>
+          <p:cNvSpPr/>
+          <p:nvPr/>
+        </p:nvSpPr>
+        <p:spPr>
+          <a:xfrm>
+            <a:off x="1908835" y="786884"/>
+            <a:ext cx="3975512" cy="369332"/>
+          </a:xfrm>
+          <a:prstGeom prst="rect">
+            <a:avLst/>
+          </a:prstGeom>
+        </p:spPr>
+        <p:txBody>
+          <a:bodyPr wrap="none">
+            <a:spAutoFit/>
+          </a:bodyPr>
+          <a:lstStyle/>
+          <a:p>
+            <a:r>
+              <a:rPr lang="es-CO" dirty="0">
+                <a:hlinkClick r:id="rId2"/>
+              </a:rPr>
+              <a:t>https://github.com/Dalvarez491/IdHand</a:t>
+            </a:r>
+            <a:endParaRPr lang="es-CO" dirty="0"/>
+          </a:p>
+        </p:txBody>
+      </p:sp>
+      <p:pic>
+        <p:nvPicPr>
+          <p:cNvPr id="4" name="Imagen 3"/>
+          <p:cNvPicPr>
+            <a:picLocks noChangeAspect="1"/>
+          </p:cNvPicPr>
+          <p:nvPr/>
+        </p:nvPicPr>
+        <p:blipFill rotWithShape="1">
+          <a:blip r:embed="rId3">
+            <a:extLst>
+              <a:ext uri="{28A0092B-C50C-407E-A947-70E740481C1C}">
+                <a14:useLocalDpi xmlns:a14="http://schemas.microsoft.com/office/drawing/2010/main" val="0"/>
+              </a:ext>
+            </a:extLst>
+          </a:blip>
+          <a:srcRect l="8181" t="4826" r="11250" b="22209"/>
+          <a:stretch/>
+        </p:blipFill>
+        <p:spPr>
+          <a:xfrm>
+            <a:off x="1981572" y="1156216"/>
+            <a:ext cx="6203375" cy="3158559"/>
+          </a:xfrm>
+          <a:prstGeom prst="rect">
+            <a:avLst/>
+          </a:prstGeom>
+        </p:spPr>
+      </p:pic>
+    </p:spTree>
+    <p:extLst>
+      <p:ext uri="{BB962C8B-B14F-4D97-AF65-F5344CB8AC3E}">
+        <p14:creationId xmlns:p14="http://schemas.microsoft.com/office/powerpoint/2010/main" val="2335984454"/>
+      </p:ext>
+    </p:extLst>
+  </p:cSld>
+  <p:clrMapOvr>
+    <a:masterClrMapping/>
+  </p:clrMapOvr>
+</p:sld>
+</file>
+
+<file path=ppt/slides/slide21.xml><?xml version="1.0" encoding="utf-8"?>
 <p:sld xmlns:a="http://schemas.openxmlformats.org/drawingml/2006/main" xmlns:r="http://schemas.openxmlformats.org/officeDocument/2006/relationships" xmlns:p="http://schemas.openxmlformats.org/presentationml/2006/main">
   <p:cSld>
     <p:spTree>
@@ -3659,7 +3752,7 @@
         <p:spPr>
           <a:xfrm>
             <a:off x="358484" y="728604"/>
-            <a:ext cx="8011392" cy="3539430"/>
+            <a:ext cx="8011392" cy="3046988"/>
           </a:xfrm>
           <a:prstGeom prst="rect">
             <a:avLst/>
@@ -3675,7 +3768,15 @@
             <a:pPr algn="just"/>
             <a:r>
               <a:rPr lang="es-CO" sz="3200" dirty="0"/>
-              <a:t>En la pulsera se incluirá un botón de emergencia el cual al presionarlo se escuchará la información que el usuario grabo mediante nuestra aplicación, a los organismos de socorro. Esto se realizará con el fin de mejorar la atención brindada por los organismos de socorro a las </a:t>
+              <a:t>En la pulsera se incluirá un botón de emergencia el cual al presionarlo se escuchará la información que el usuario grabo mediante nuestra </a:t>
+            </a:r>
+            <a:r>
+              <a:rPr lang="es-CO" sz="3200" dirty="0" smtClean="0"/>
+              <a:t>aplicación. Esto </a:t>
+            </a:r>
+            <a:r>
+              <a:rPr lang="es-CO" sz="3200" dirty="0"/>
+              <a:t>se realizará con el fin de mejorar la atención brindada por los organismos de socorro a las </a:t>
             </a:r>
             <a:r>
               <a:rPr lang="es-CO" sz="3200" dirty="0" smtClean="0"/>

</xml_diff>